<commit_message>
Finalized baseline course for week 0
</commit_message>
<xml_diff>
--- a/content/week0/slides/week0.pptx
+++ b/content/week0/slides/week0.pptx
@@ -7164,7 +7164,7 @@
           <a:p>
             <a:fld id="{C17F2C1D-F243-42AB-ADF2-E7CB4E04900E}" type="datetimeFigureOut">
               <a:rPr lang="en-US" smtClean="0"/>
-              <a:t>11/3/2022</a:t>
+              <a:t>11/5/2022</a:t>
             </a:fld>
             <a:endParaRPr lang="en-US"/>
           </a:p>
@@ -7341,7 +7341,7 @@
           <a:p>
             <a:fld id="{020CE34E-5667-4A32-A6BA-10C7A552BC63}" type="datetimeFigureOut">
               <a:rPr lang="en-US" smtClean="0"/>
-              <a:t>11/3/2022</a:t>
+              <a:t>11/5/2022</a:t>
             </a:fld>
             <a:endParaRPr lang="en-US"/>
           </a:p>
@@ -21747,13 +21747,13 @@
   <p:clrMapOvr>
     <a:masterClrMapping/>
   </p:clrMapOvr>
-  <mc:AlternateContent xmlns:mc="http://schemas.openxmlformats.org/markup-compatibility/2006">
-    <mc:Choice xmlns:p159="http://schemas.microsoft.com/office/powerpoint/2015/09/main" Requires="p159">
+  <mc:AlternateContent xmlns:mc="http://schemas.openxmlformats.org/markup-compatibility/2006" xmlns:p159="http://schemas.microsoft.com/office/powerpoint/2015/09/main">
+    <mc:Choice Requires="p159">
       <p:transition xmlns:p14="http://schemas.microsoft.com/office/powerpoint/2010/main" spd="slow" p14:dur="2000">
         <p159:morph option="byChar"/>
       </p:transition>
     </mc:Choice>
-    <mc:Fallback>
+    <mc:Fallback xmlns="">
       <p:transition spd="slow">
         <p:fade/>
       </p:transition>
@@ -22573,13 +22573,13 @@
   <p:clrMapOvr>
     <a:masterClrMapping/>
   </p:clrMapOvr>
-  <mc:AlternateContent xmlns:mc="http://schemas.openxmlformats.org/markup-compatibility/2006">
-    <mc:Choice xmlns:p159="http://schemas.microsoft.com/office/powerpoint/2015/09/main" Requires="p159">
+  <mc:AlternateContent xmlns:mc="http://schemas.openxmlformats.org/markup-compatibility/2006" xmlns:p159="http://schemas.microsoft.com/office/powerpoint/2015/09/main">
+    <mc:Choice Requires="p159">
       <p:transition xmlns:p14="http://schemas.microsoft.com/office/powerpoint/2010/main" spd="slow" p14:dur="2000">
         <p159:morph option="byChar"/>
       </p:transition>
     </mc:Choice>
-    <mc:Fallback>
+    <mc:Fallback xmlns="">
       <p:transition spd="slow">
         <p:fade/>
       </p:transition>
@@ -23007,18 +23007,73 @@
           </a:p>
           <a:p>
             <a:r>
-              <a:rPr lang="en-US" dirty="0"/>
-              <a:t>curl – Online asset retrieval</a:t>
+              <a:rPr lang="en-US" dirty="0" err="1"/>
+              <a:t>cURL</a:t>
             </a:r>
-          </a:p>
-          <a:p>
             <a:r>
               <a:rPr lang="en-US" dirty="0"/>
-              <a:t>make – C </a:t>
+              <a:t> – Online asset retrieval</a:t>
+            </a:r>
+          </a:p>
+          <a:p>
+            <a:r>
+              <a:rPr lang="en-US" dirty="0"/>
+              <a:t>make – C build recipe tool</a:t>
+            </a:r>
+          </a:p>
+          <a:p>
+            <a:r>
+              <a:rPr lang="en-US" dirty="0" err="1"/>
+              <a:t>Cmake</a:t>
+            </a:r>
+            <a:r>
+              <a:rPr lang="en-US" dirty="0"/>
+              <a:t> – Cross platform recipe builder</a:t>
+            </a:r>
+          </a:p>
+          <a:p>
+            <a:r>
+              <a:rPr lang="en-US" dirty="0" err="1"/>
+              <a:t>bpt</a:t>
+            </a:r>
+            <a:r>
+              <a:rPr lang="en-US" dirty="0"/>
+              <a:t> – Build and packaging tool for C++</a:t>
+            </a:r>
+          </a:p>
+          <a:p>
+            <a:r>
+              <a:rPr lang="en-US" dirty="0"/>
+              <a:t>GCC – GNU Compiler Collection</a:t>
+            </a:r>
+          </a:p>
+          <a:p>
+            <a:r>
+              <a:rPr lang="en-US" dirty="0"/>
+              <a:t>LLVM – Toolchain for Clang compiler</a:t>
+            </a:r>
+          </a:p>
+          <a:p>
+            <a:r>
+              <a:rPr lang="en-US" dirty="0"/>
+              <a:t>GDB – GNU Debugger</a:t>
+            </a:r>
+          </a:p>
+          <a:p>
+            <a:r>
+              <a:rPr lang="en-US" dirty="0"/>
+              <a:t>g++ and clang</a:t>
             </a:r>
             <a:r>
               <a:rPr lang="en-US"/>
-              <a:t>build recipe tool</a:t>
+              <a:t>++ compilers</a:t>
+            </a:r>
+            <a:endParaRPr lang="en-US" dirty="0"/>
+          </a:p>
+          <a:p>
+            <a:r>
+              <a:rPr lang="en-US" dirty="0"/>
+              <a:t>Compiler Explorer – Online C++ Compiler</a:t>
             </a:r>
           </a:p>
           <a:p>
@@ -23302,13 +23357,13 @@
   <p:clrMapOvr>
     <a:masterClrMapping/>
   </p:clrMapOvr>
-  <mc:AlternateContent xmlns:mc="http://schemas.openxmlformats.org/markup-compatibility/2006">
-    <mc:Choice xmlns:p159="http://schemas.microsoft.com/office/powerpoint/2015/09/main" Requires="p159">
+  <mc:AlternateContent xmlns:mc="http://schemas.openxmlformats.org/markup-compatibility/2006" xmlns:p159="http://schemas.microsoft.com/office/powerpoint/2015/09/main">
+    <mc:Choice Requires="p159">
       <p:transition xmlns:p14="http://schemas.microsoft.com/office/powerpoint/2010/main" spd="slow" p14:dur="2000">
         <p159:morph option="byChar"/>
       </p:transition>
     </mc:Choice>
-    <mc:Fallback>
+    <mc:Fallback xmlns="">
       <p:transition spd="slow">
         <p:fade/>
       </p:transition>
@@ -24599,13 +24654,13 @@
   <p:clrMapOvr>
     <a:masterClrMapping/>
   </p:clrMapOvr>
-  <mc:AlternateContent xmlns:mc="http://schemas.openxmlformats.org/markup-compatibility/2006">
-    <mc:Choice xmlns:p159="http://schemas.microsoft.com/office/powerpoint/2015/09/main" Requires="p159">
+  <mc:AlternateContent xmlns:mc="http://schemas.openxmlformats.org/markup-compatibility/2006" xmlns:p159="http://schemas.microsoft.com/office/powerpoint/2015/09/main">
+    <mc:Choice Requires="p159">
       <p:transition xmlns:p14="http://schemas.microsoft.com/office/powerpoint/2010/main" spd="slow" p14:dur="2000">
         <p159:morph option="byChar"/>
       </p:transition>
     </mc:Choice>
-    <mc:Fallback>
+    <mc:Fallback xmlns="">
       <p:transition spd="slow">
         <p:fade/>
       </p:transition>
@@ -30744,13 +30799,13 @@
   <p:clrMapOvr>
     <a:masterClrMapping/>
   </p:clrMapOvr>
-  <mc:AlternateContent xmlns:mc="http://schemas.openxmlformats.org/markup-compatibility/2006">
-    <mc:Choice xmlns:p159="http://schemas.microsoft.com/office/powerpoint/2015/09/main" Requires="p159">
+  <mc:AlternateContent xmlns:mc="http://schemas.openxmlformats.org/markup-compatibility/2006" xmlns:p159="http://schemas.microsoft.com/office/powerpoint/2015/09/main">
+    <mc:Choice Requires="p159">
       <p:transition xmlns:p14="http://schemas.microsoft.com/office/powerpoint/2010/main" spd="slow" p14:dur="2000">
         <p159:morph option="byChar"/>
       </p:transition>
     </mc:Choice>
-    <mc:Fallback>
+    <mc:Fallback xmlns="">
       <p:transition spd="slow">
         <p:fade/>
       </p:transition>
@@ -33083,13 +33138,13 @@
   <p:clrMapOvr>
     <a:masterClrMapping/>
   </p:clrMapOvr>
-  <mc:AlternateContent xmlns:mc="http://schemas.openxmlformats.org/markup-compatibility/2006">
-    <mc:Choice xmlns:p159="http://schemas.microsoft.com/office/powerpoint/2015/09/main" Requires="p159">
+  <mc:AlternateContent xmlns:mc="http://schemas.openxmlformats.org/markup-compatibility/2006" xmlns:p159="http://schemas.microsoft.com/office/powerpoint/2015/09/main">
+    <mc:Choice Requires="p159">
       <p:transition xmlns:p14="http://schemas.microsoft.com/office/powerpoint/2010/main" spd="slow" p14:dur="2000">
         <p159:morph option="byChar"/>
       </p:transition>
     </mc:Choice>
-    <mc:Fallback>
+    <mc:Fallback xmlns="">
       <p:transition spd="slow">
         <p:fade/>
       </p:transition>
@@ -33933,13 +33988,13 @@
   <p:clrMapOvr>
     <a:masterClrMapping/>
   </p:clrMapOvr>
-  <mc:AlternateContent xmlns:mc="http://schemas.openxmlformats.org/markup-compatibility/2006">
-    <mc:Choice xmlns:p159="http://schemas.microsoft.com/office/powerpoint/2015/09/main" Requires="p159">
+  <mc:AlternateContent xmlns:mc="http://schemas.openxmlformats.org/markup-compatibility/2006" xmlns:p159="http://schemas.microsoft.com/office/powerpoint/2015/09/main">
+    <mc:Choice Requires="p159">
       <p:transition xmlns:p14="http://schemas.microsoft.com/office/powerpoint/2010/main" spd="slow" p14:dur="2000">
         <p159:morph option="byChar"/>
       </p:transition>
     </mc:Choice>
-    <mc:Fallback>
+    <mc:Fallback xmlns="">
       <p:transition spd="slow">
         <p:fade/>
       </p:transition>
@@ -34740,15 +34795,6 @@
 </file>
 
 <file path=customXml/item1.xml><?xml version="1.0" encoding="utf-8"?>
-<?mso-contentType ?>
-<FormTemplates xmlns="http://schemas.microsoft.com/sharepoint/v3/contenttype/forms">
-  <Display>DocumentLibraryForm</Display>
-  <Edit>DocumentLibraryForm</Edit>
-  <New>DocumentLibraryForm</New>
-</FormTemplates>
-</file>
-
-<file path=customXml/item2.xml><?xml version="1.0" encoding="utf-8"?>
 <p:properties xmlns:p="http://schemas.microsoft.com/office/2006/metadata/properties" xmlns:xsi="http://www.w3.org/2001/XMLSchema-instance" xmlns:pc="http://schemas.microsoft.com/office/infopath/2007/PartnerControls">
   <documentManagement>
     <_ip_UnifiedCompliancePolicyUIAction xmlns="http://schemas.microsoft.com/sharepoint/v3" xsi:nil="true"/>
@@ -34765,6 +34811,15 @@
     <MediaServiceKeyPoints xmlns="71af3243-3dd4-4a8d-8c0d-dd76da1f02a5" xsi:nil="true"/>
   </documentManagement>
 </p:properties>
+</file>
+
+<file path=customXml/item2.xml><?xml version="1.0" encoding="utf-8"?>
+<?mso-contentType ?>
+<FormTemplates xmlns="http://schemas.microsoft.com/sharepoint/v3/contenttype/forms">
+  <Display>DocumentLibraryForm</Display>
+  <Edit>DocumentLibraryForm</Edit>
+  <New>DocumentLibraryForm</New>
+</FormTemplates>
 </file>
 
 <file path=customXml/item3.xml><?xml version="1.0" encoding="utf-8"?>
@@ -35044,14 +35099,6 @@
 </file>
 
 <file path=customXml/itemProps1.xml><?xml version="1.0" encoding="utf-8"?>
-<ds:datastoreItem xmlns:ds="http://schemas.openxmlformats.org/officeDocument/2006/customXml" ds:itemID="{904751AB-E840-446F-8D49-E697067EC887}">
-  <ds:schemaRefs>
-    <ds:schemaRef ds:uri="http://schemas.microsoft.com/sharepoint/v3/contenttype/forms"/>
-  </ds:schemaRefs>
-</ds:datastoreItem>
-</file>
-
-<file path=customXml/itemProps2.xml><?xml version="1.0" encoding="utf-8"?>
 <ds:datastoreItem xmlns:ds="http://schemas.openxmlformats.org/officeDocument/2006/customXml" ds:itemID="{50811A92-D464-4AC4-A396-BA73B10CEEAC}">
   <ds:schemaRefs>
     <ds:schemaRef ds:uri="http://schemas.microsoft.com/office/2006/metadata/properties"/>
@@ -35059,6 +35106,14 @@
     <ds:schemaRef ds:uri="http://schemas.microsoft.com/sharepoint/v3"/>
     <ds:schemaRef ds:uri="71af3243-3dd4-4a8d-8c0d-dd76da1f02a5"/>
     <ds:schemaRef ds:uri="230e9df3-be65-4c73-a93b-d1236ebd677e"/>
+  </ds:schemaRefs>
+</ds:datastoreItem>
+</file>
+
+<file path=customXml/itemProps2.xml><?xml version="1.0" encoding="utf-8"?>
+<ds:datastoreItem xmlns:ds="http://schemas.openxmlformats.org/officeDocument/2006/customXml" ds:itemID="{904751AB-E840-446F-8D49-E697067EC887}">
+  <ds:schemaRefs>
+    <ds:schemaRef ds:uri="http://schemas.microsoft.com/sharepoint/v3/contenttype/forms"/>
   </ds:schemaRefs>
 </ds:datastoreItem>
 </file>

</xml_diff>